<commit_message>
mise à jour et corrections coquilles plt.imread et dataset/photos
</commit_message>
<xml_diff>
--- a/Naudy_Antoine_5_presentation_032023.pptx
+++ b/Naudy_Antoine_5_presentation_032023.pptx
@@ -587,7 +587,7 @@
           <a:effectLst/>
           <a:extLst>
             <a:ext uri="{91240B29-F687-4f45-9708-019B960494DF}">
-              <a14:hiddenLine xmlns:a14="http://schemas.microsoft.com/office/drawing/2010/main" xmlns="" w="9525">
+              <a14:hiddenLine xmlns="" xmlns:a14="http://schemas.microsoft.com/office/drawing/2010/main" w="9525">
                 <a:solidFill>
                   <a:srgbClr val="000000"/>
                 </a:solidFill>
@@ -2093,7 +2093,7 @@
           <a:ln/>
           <a:extLst>
             <a:ext uri="{91240B29-F687-4f45-9708-019B960494DF}">
-              <a14:hiddenLine xmlns:a14="http://schemas.microsoft.com/office/drawing/2010/main" xmlns="" w="9525">
+              <a14:hiddenLine xmlns="" xmlns:a14="http://schemas.microsoft.com/office/drawing/2010/main" w="9525">
                 <a:solidFill>
                   <a:srgbClr val="000000"/>
                 </a:solidFill>
@@ -2364,7 +2364,7 @@
           <a:ln/>
           <a:extLst>
             <a:ext uri="{91240B29-F687-4f45-9708-019B960494DF}">
-              <a14:hiddenLine xmlns:a14="http://schemas.microsoft.com/office/drawing/2010/main" xmlns="" w="9525">
+              <a14:hiddenLine xmlns="" xmlns:a14="http://schemas.microsoft.com/office/drawing/2010/main" w="9525">
                 <a:solidFill>
                   <a:srgbClr val="000000"/>
                 </a:solidFill>
@@ -2643,7 +2643,7 @@
           <a:ln/>
           <a:extLst>
             <a:ext uri="{91240B29-F687-4f45-9708-019B960494DF}">
-              <a14:hiddenLine xmlns:a14="http://schemas.microsoft.com/office/drawing/2010/main" xmlns="" w="9525">
+              <a14:hiddenLine xmlns="" xmlns:a14="http://schemas.microsoft.com/office/drawing/2010/main" w="9525">
                 <a:solidFill>
                   <a:srgbClr val="000000"/>
                 </a:solidFill>
@@ -3261,7 +3261,7 @@
           <a:ln/>
           <a:extLst>
             <a:ext uri="{91240B29-F687-4f45-9708-019B960494DF}">
-              <a14:hiddenLine xmlns:a14="http://schemas.microsoft.com/office/drawing/2010/main" xmlns="" w="9525">
+              <a14:hiddenLine xmlns="" xmlns:a14="http://schemas.microsoft.com/office/drawing/2010/main" w="9525">
                 <a:solidFill>
                   <a:srgbClr val="000000"/>
                 </a:solidFill>
@@ -3596,7 +3596,7 @@
           <a:ln/>
           <a:extLst>
             <a:ext uri="{91240B29-F687-4f45-9708-019B960494DF}">
-              <a14:hiddenLine xmlns:a14="http://schemas.microsoft.com/office/drawing/2010/main" xmlns="" w="9525">
+              <a14:hiddenLine xmlns="" xmlns:a14="http://schemas.microsoft.com/office/drawing/2010/main" w="9525">
                 <a:solidFill>
                   <a:srgbClr val="000000"/>
                 </a:solidFill>
@@ -4069,7 +4069,7 @@
           <a:ln/>
           <a:extLst>
             <a:ext uri="{91240B29-F687-4f45-9708-019B960494DF}">
-              <a14:hiddenLine xmlns:a14="http://schemas.microsoft.com/office/drawing/2010/main" xmlns="" w="9525">
+              <a14:hiddenLine xmlns="" xmlns:a14="http://schemas.microsoft.com/office/drawing/2010/main" w="9525">
                 <a:solidFill>
                   <a:srgbClr val="000000"/>
                 </a:solidFill>
@@ -4490,7 +4490,7 @@
           <a:ln/>
           <a:extLst>
             <a:ext uri="{91240B29-F687-4f45-9708-019B960494DF}">
-              <a14:hiddenLine xmlns:a14="http://schemas.microsoft.com/office/drawing/2010/main" xmlns="" w="9525">
+              <a14:hiddenLine xmlns="" xmlns:a14="http://schemas.microsoft.com/office/drawing/2010/main" w="9525">
                 <a:solidFill>
                   <a:srgbClr val="000000"/>
                 </a:solidFill>
@@ -11034,53 +11034,6 @@
           </a:p>
         </p:txBody>
       </p:sp>
-      <p:pic>
-        <p:nvPicPr>
-          <p:cNvPr id="5122" name="Picture 2">
-            <a:extLst>
-              <a:ext uri="{FF2B5EF4-FFF2-40B4-BE49-F238E27FC236}">
-                <a16:creationId xmlns:a16="http://schemas.microsoft.com/office/drawing/2014/main" id="{D5EC3D68-DB46-DCE1-E058-1DB5E44F815F}"/>
-              </a:ext>
-            </a:extLst>
-          </p:cNvPr>
-          <p:cNvPicPr>
-            <a:picLocks noChangeAspect="1" noChangeArrowheads="1"/>
-          </p:cNvPicPr>
-          <p:nvPr/>
-        </p:nvPicPr>
-        <p:blipFill>
-          <a:blip r:embed="rId2">
-            <a:extLst>
-              <a:ext uri="{28A0092B-C50C-407E-A947-70E740481C1C}">
-                <a14:useLocalDpi xmlns:a14="http://schemas.microsoft.com/office/drawing/2010/main" val="0"/>
-              </a:ext>
-            </a:extLst>
-          </a:blip>
-          <a:srcRect/>
-          <a:stretch>
-            <a:fillRect/>
-          </a:stretch>
-        </p:blipFill>
-        <p:spPr bwMode="auto">
-          <a:xfrm>
-            <a:off x="2052043" y="3447011"/>
-            <a:ext cx="6537489" cy="3304309"/>
-          </a:xfrm>
-          <a:prstGeom prst="rect">
-            <a:avLst/>
-          </a:prstGeom>
-          <a:noFill/>
-          <a:extLst>
-            <a:ext uri="{909E8E84-426E-40DD-AFC4-6F175D3DCCD1}">
-              <a14:hiddenFill xmlns:a14="http://schemas.microsoft.com/office/drawing/2010/main">
-                <a:solidFill>
-                  <a:srgbClr val="FFFFFF"/>
-                </a:solidFill>
-              </a14:hiddenFill>
-            </a:ext>
-          </a:extLst>
-        </p:spPr>
-      </p:pic>
       <p:sp>
         <p:nvSpPr>
           <p:cNvPr id="6" name="Espace réservé du contenu 2">
@@ -11309,17 +11262,64 @@
           <a:p>
             <a:r>
               <a:rPr lang="fr-FR" dirty="0"/>
-              <a:t>Acc : 0.79</a:t>
+              <a:t>Acc : 0.80</a:t>
             </a:r>
           </a:p>
           <a:p>
             <a:r>
               <a:rPr lang="fr-FR" dirty="0"/>
-              <a:t>ARI : 0.58</a:t>
-            </a:r>
-          </a:p>
-        </p:txBody>
-      </p:sp>
+              <a:t>ARI : 0.61</a:t>
+            </a:r>
+          </a:p>
+        </p:txBody>
+      </p:sp>
+      <p:pic>
+        <p:nvPicPr>
+          <p:cNvPr id="2050" name="Picture 2">
+            <a:extLst>
+              <a:ext uri="{FF2B5EF4-FFF2-40B4-BE49-F238E27FC236}">
+                <a16:creationId xmlns:a16="http://schemas.microsoft.com/office/drawing/2014/main" id="{A80EF829-A917-2217-500B-056F6BF3DD03}"/>
+              </a:ext>
+            </a:extLst>
+          </p:cNvPr>
+          <p:cNvPicPr>
+            <a:picLocks noChangeAspect="1" noChangeArrowheads="1"/>
+          </p:cNvPicPr>
+          <p:nvPr/>
+        </p:nvPicPr>
+        <p:blipFill>
+          <a:blip r:embed="rId2">
+            <a:extLst>
+              <a:ext uri="{28A0092B-C50C-407E-A947-70E740481C1C}">
+                <a14:useLocalDpi xmlns:a14="http://schemas.microsoft.com/office/drawing/2010/main" val="0"/>
+              </a:ext>
+            </a:extLst>
+          </a:blip>
+          <a:srcRect/>
+          <a:stretch>
+            <a:fillRect/>
+          </a:stretch>
+        </p:blipFill>
+        <p:spPr bwMode="auto">
+          <a:xfrm>
+            <a:off x="2409265" y="3415567"/>
+            <a:ext cx="6556603" cy="3313970"/>
+          </a:xfrm>
+          <a:prstGeom prst="rect">
+            <a:avLst/>
+          </a:prstGeom>
+          <a:noFill/>
+          <a:extLst>
+            <a:ext uri="{909E8E84-426E-40DD-AFC4-6F175D3DCCD1}">
+              <a14:hiddenFill xmlns:a14="http://schemas.microsoft.com/office/drawing/2010/main">
+                <a:solidFill>
+                  <a:srgbClr val="FFFFFF"/>
+                </a:solidFill>
+              </a14:hiddenFill>
+            </a:ext>
+          </a:extLst>
+        </p:spPr>
+      </p:pic>
     </p:spTree>
     <p:extLst>
       <p:ext uri="{BB962C8B-B14F-4D97-AF65-F5344CB8AC3E}">
@@ -11512,276 +11512,12 @@
           </a:p>
         </p:txBody>
       </p:sp>
-      <p:sp>
-        <p:nvSpPr>
-          <p:cNvPr id="6" name="Espace réservé du contenu 2">
-            <a:extLst>
-              <a:ext uri="{FF2B5EF4-FFF2-40B4-BE49-F238E27FC236}">
-                <a16:creationId xmlns:a16="http://schemas.microsoft.com/office/drawing/2014/main" id="{35FA10E9-7F4A-FE9C-8C25-E03BFAC40AC6}"/>
-              </a:ext>
-            </a:extLst>
-          </p:cNvPr>
-          <p:cNvSpPr txBox="1">
-            <a:spLocks/>
-          </p:cNvSpPr>
-          <p:nvPr/>
-        </p:nvSpPr>
-        <p:spPr>
-          <a:xfrm>
-            <a:off x="9831575" y="4663713"/>
-            <a:ext cx="2055626" cy="1252175"/>
-          </a:xfrm>
-          <a:prstGeom prst="rect">
-            <a:avLst/>
-          </a:prstGeom>
-          <a:effectLst>
-            <a:outerShdw blurRad="50800" dir="14400000">
-              <a:srgbClr val="000000">
-                <a:alpha val="40000"/>
-              </a:srgbClr>
-            </a:outerShdw>
-          </a:effectLst>
-        </p:spPr>
-        <p:txBody>
-          <a:bodyPr vert="horz" lIns="91440" tIns="45720" rIns="91440" bIns="45720" rtlCol="0" anchor="t" anchorCtr="0">
-            <a:normAutofit/>
-          </a:bodyPr>
-          <a:lstStyle>
-            <a:lvl1pPr marL="342900" indent="-342900" algn="l" defTabSz="457200" rtl="0" eaLnBrk="1" latinLnBrk="0" hangingPunct="1">
-              <a:spcBef>
-                <a:spcPct val="20000"/>
-              </a:spcBef>
-              <a:spcAft>
-                <a:spcPts val="600"/>
-              </a:spcAft>
-              <a:buClr>
-                <a:schemeClr val="accent1"/>
-              </a:buClr>
-              <a:buFont typeface="Wingdings 2" charset="2"/>
-              <a:buChar char=""/>
-              <a:defRPr sz="1800" kern="1200">
-                <a:solidFill>
-                  <a:schemeClr val="tx1"/>
-                </a:solidFill>
-                <a:latin typeface="+mn-lt"/>
-                <a:ea typeface="+mn-ea"/>
-                <a:cs typeface="+mn-cs"/>
-              </a:defRPr>
-            </a:lvl1pPr>
-            <a:lvl2pPr marL="742950" indent="-285750" algn="l" defTabSz="457200" rtl="0" eaLnBrk="1" latinLnBrk="0" hangingPunct="1">
-              <a:spcBef>
-                <a:spcPct val="20000"/>
-              </a:spcBef>
-              <a:spcAft>
-                <a:spcPts val="600"/>
-              </a:spcAft>
-              <a:buClr>
-                <a:schemeClr val="accent1"/>
-              </a:buClr>
-              <a:buFont typeface="Wingdings 2" charset="2"/>
-              <a:buChar char=""/>
-              <a:defRPr sz="1600" kern="1200">
-                <a:solidFill>
-                  <a:schemeClr val="tx1"/>
-                </a:solidFill>
-                <a:latin typeface="+mn-lt"/>
-                <a:ea typeface="+mn-ea"/>
-                <a:cs typeface="+mn-cs"/>
-              </a:defRPr>
-            </a:lvl2pPr>
-            <a:lvl3pPr marL="1143000" indent="-228600" algn="l" defTabSz="457200" rtl="0" eaLnBrk="1" latinLnBrk="0" hangingPunct="1">
-              <a:spcBef>
-                <a:spcPct val="20000"/>
-              </a:spcBef>
-              <a:spcAft>
-                <a:spcPts val="600"/>
-              </a:spcAft>
-              <a:buClr>
-                <a:schemeClr val="accent1"/>
-              </a:buClr>
-              <a:buFont typeface="Wingdings 2" charset="2"/>
-              <a:buChar char=""/>
-              <a:defRPr sz="1400" kern="1200">
-                <a:solidFill>
-                  <a:schemeClr val="tx1"/>
-                </a:solidFill>
-                <a:latin typeface="+mn-lt"/>
-                <a:ea typeface="+mn-ea"/>
-                <a:cs typeface="+mn-cs"/>
-              </a:defRPr>
-            </a:lvl3pPr>
-            <a:lvl4pPr marL="1600200" indent="-228600" algn="l" defTabSz="457200" rtl="0" eaLnBrk="1" latinLnBrk="0" hangingPunct="1">
-              <a:spcBef>
-                <a:spcPct val="20000"/>
-              </a:spcBef>
-              <a:spcAft>
-                <a:spcPts val="600"/>
-              </a:spcAft>
-              <a:buClr>
-                <a:schemeClr val="accent1"/>
-              </a:buClr>
-              <a:buFont typeface="Wingdings 2" charset="2"/>
-              <a:buChar char=""/>
-              <a:defRPr sz="1200" kern="1200">
-                <a:solidFill>
-                  <a:schemeClr val="tx1"/>
-                </a:solidFill>
-                <a:latin typeface="+mn-lt"/>
-                <a:ea typeface="+mn-ea"/>
-                <a:cs typeface="+mn-cs"/>
-              </a:defRPr>
-            </a:lvl4pPr>
-            <a:lvl5pPr marL="2057400" indent="-228600" algn="l" defTabSz="457200" rtl="0" eaLnBrk="1" latinLnBrk="0" hangingPunct="1">
-              <a:spcBef>
-                <a:spcPct val="20000"/>
-              </a:spcBef>
-              <a:spcAft>
-                <a:spcPts val="600"/>
-              </a:spcAft>
-              <a:buClr>
-                <a:schemeClr val="accent1"/>
-              </a:buClr>
-              <a:buFont typeface="Wingdings 2" charset="2"/>
-              <a:buChar char=""/>
-              <a:defRPr sz="1200" kern="1200">
-                <a:solidFill>
-                  <a:schemeClr val="tx1"/>
-                </a:solidFill>
-                <a:latin typeface="+mn-lt"/>
-                <a:ea typeface="+mn-ea"/>
-                <a:cs typeface="+mn-cs"/>
-              </a:defRPr>
-            </a:lvl5pPr>
-            <a:lvl6pPr marL="2400000" indent="-228600" algn="l" defTabSz="457200" rtl="0" eaLnBrk="1" latinLnBrk="0" hangingPunct="1">
-              <a:spcBef>
-                <a:spcPct val="20000"/>
-              </a:spcBef>
-              <a:spcAft>
-                <a:spcPts val="600"/>
-              </a:spcAft>
-              <a:buClr>
-                <a:schemeClr val="accent1"/>
-              </a:buClr>
-              <a:buFont typeface="Wingdings 2" charset="2"/>
-              <a:buChar char=""/>
-              <a:defRPr sz="1200" kern="1200">
-                <a:solidFill>
-                  <a:schemeClr val="tx1"/>
-                </a:solidFill>
-                <a:latin typeface="+mn-lt"/>
-                <a:ea typeface="+mn-ea"/>
-                <a:cs typeface="+mn-cs"/>
-              </a:defRPr>
-            </a:lvl6pPr>
-            <a:lvl7pPr marL="2800000" indent="-228600" algn="l" defTabSz="457200" rtl="0" eaLnBrk="1" latinLnBrk="0" hangingPunct="1">
-              <a:spcBef>
-                <a:spcPct val="20000"/>
-              </a:spcBef>
-              <a:spcAft>
-                <a:spcPts val="600"/>
-              </a:spcAft>
-              <a:buClr>
-                <a:schemeClr val="accent1"/>
-              </a:buClr>
-              <a:buFont typeface="Wingdings 2" charset="2"/>
-              <a:buChar char=""/>
-              <a:defRPr sz="1200" kern="1200">
-                <a:solidFill>
-                  <a:schemeClr val="tx1"/>
-                </a:solidFill>
-                <a:latin typeface="+mn-lt"/>
-                <a:ea typeface="+mn-ea"/>
-                <a:cs typeface="+mn-cs"/>
-              </a:defRPr>
-            </a:lvl7pPr>
-            <a:lvl8pPr marL="3200000" indent="-228600" algn="l" defTabSz="457200" rtl="0" eaLnBrk="1" latinLnBrk="0" hangingPunct="1">
-              <a:spcBef>
-                <a:spcPct val="20000"/>
-              </a:spcBef>
-              <a:spcAft>
-                <a:spcPts val="600"/>
-              </a:spcAft>
-              <a:buClr>
-                <a:schemeClr val="accent1"/>
-              </a:buClr>
-              <a:buFont typeface="Wingdings 2" charset="2"/>
-              <a:buChar char=""/>
-              <a:defRPr sz="1200" kern="1200">
-                <a:solidFill>
-                  <a:schemeClr val="tx1"/>
-                </a:solidFill>
-                <a:latin typeface="+mn-lt"/>
-                <a:ea typeface="+mn-ea"/>
-                <a:cs typeface="+mn-cs"/>
-              </a:defRPr>
-            </a:lvl8pPr>
-            <a:lvl9pPr marL="3600000" indent="-228600" algn="l" defTabSz="457200" rtl="0" eaLnBrk="1" latinLnBrk="0" hangingPunct="1">
-              <a:spcBef>
-                <a:spcPct val="20000"/>
-              </a:spcBef>
-              <a:spcAft>
-                <a:spcPts val="600"/>
-              </a:spcAft>
-              <a:buClr>
-                <a:schemeClr val="accent1"/>
-              </a:buClr>
-              <a:buFont typeface="Wingdings 2" charset="2"/>
-              <a:buChar char=""/>
-              <a:defRPr sz="1200" kern="1200">
-                <a:solidFill>
-                  <a:schemeClr val="tx1"/>
-                </a:solidFill>
-                <a:latin typeface="+mn-lt"/>
-                <a:ea typeface="+mn-ea"/>
-                <a:cs typeface="+mn-cs"/>
-              </a:defRPr>
-            </a:lvl9pPr>
-          </a:lstStyle>
-          <a:p>
-            <a:r>
-              <a:rPr lang="fr-FR" dirty="0"/>
-              <a:t>Acc : 0.79</a:t>
-            </a:r>
-            <a:endParaRPr lang="fr-FR" i="1" dirty="0"/>
-          </a:p>
-        </p:txBody>
-      </p:sp>
       <p:pic>
         <p:nvPicPr>
-          <p:cNvPr id="8" name="Image 7">
+          <p:cNvPr id="1026" name="Picture 2">
             <a:extLst>
               <a:ext uri="{FF2B5EF4-FFF2-40B4-BE49-F238E27FC236}">
-                <a16:creationId xmlns:a16="http://schemas.microsoft.com/office/drawing/2014/main" id="{39AE661E-748F-8063-0042-21BE89D609DF}"/>
-              </a:ext>
-            </a:extLst>
-          </p:cNvPr>
-          <p:cNvPicPr>
-            <a:picLocks noChangeAspect="1"/>
-          </p:cNvPicPr>
-          <p:nvPr/>
-        </p:nvPicPr>
-        <p:blipFill>
-          <a:blip r:embed="rId2"/>
-          <a:stretch>
-            <a:fillRect/>
-          </a:stretch>
-        </p:blipFill>
-        <p:spPr>
-          <a:xfrm>
-            <a:off x="6516340" y="2698087"/>
-            <a:ext cx="5622782" cy="3343275"/>
-          </a:xfrm>
-          <a:prstGeom prst="rect">
-            <a:avLst/>
-          </a:prstGeom>
-        </p:spPr>
-      </p:pic>
-      <p:pic>
-        <p:nvPicPr>
-          <p:cNvPr id="6146" name="Picture 2">
-            <a:extLst>
-              <a:ext uri="{FF2B5EF4-FFF2-40B4-BE49-F238E27FC236}">
-                <a16:creationId xmlns:a16="http://schemas.microsoft.com/office/drawing/2014/main" id="{187B9982-2DA2-2FE9-A7D2-3A5BBFCD9BF1}"/>
+                <a16:creationId xmlns:a16="http://schemas.microsoft.com/office/drawing/2014/main" id="{6A0568D3-12C5-8E93-64E7-31A46B6BFB8C}"/>
               </a:ext>
             </a:extLst>
           </p:cNvPr>
@@ -11791,7 +11527,7 @@
           <p:nvPr/>
         </p:nvPicPr>
         <p:blipFill>
-          <a:blip r:embed="rId3">
+          <a:blip r:embed="rId2">
             <a:extLst>
               <a:ext uri="{28A0092B-C50C-407E-A947-70E740481C1C}">
                 <a14:useLocalDpi xmlns:a14="http://schemas.microsoft.com/office/drawing/2010/main" val="0"/>
@@ -11805,7 +11541,7 @@
         </p:blipFill>
         <p:spPr bwMode="auto">
           <a:xfrm>
-            <a:off x="55053" y="2698087"/>
+            <a:off x="47250" y="2698087"/>
             <a:ext cx="6381750" cy="3343275"/>
           </a:xfrm>
           <a:prstGeom prst="rect">
@@ -11821,6 +11557,36 @@
               </a14:hiddenFill>
             </a:ext>
           </a:extLst>
+        </p:spPr>
+      </p:pic>
+      <p:pic>
+        <p:nvPicPr>
+          <p:cNvPr id="9" name="Image 8">
+            <a:extLst>
+              <a:ext uri="{FF2B5EF4-FFF2-40B4-BE49-F238E27FC236}">
+                <a16:creationId xmlns:a16="http://schemas.microsoft.com/office/drawing/2014/main" id="{4F9A9136-F170-B6E5-4994-9C29744C0558}"/>
+              </a:ext>
+            </a:extLst>
+          </p:cNvPr>
+          <p:cNvPicPr>
+            <a:picLocks noChangeAspect="1"/>
+          </p:cNvPicPr>
+          <p:nvPr/>
+        </p:nvPicPr>
+        <p:blipFill>
+          <a:blip r:embed="rId3"/>
+          <a:stretch>
+            <a:fillRect/>
+          </a:stretch>
+        </p:blipFill>
+        <p:spPr>
+          <a:xfrm>
+            <a:off x="6591809" y="2698086"/>
+            <a:ext cx="5252065" cy="3343275"/>
+          </a:xfrm>
+          <a:prstGeom prst="rect">
+            <a:avLst/>
+          </a:prstGeom>
         </p:spPr>
       </p:pic>
     </p:spTree>
@@ -12861,7 +12627,7 @@
           <p:nvPr>
             <p:extLst>
               <p:ext uri="{D42A27DB-BD31-4B8C-83A1-F6EECF244321}">
-                <p14:modId xmlns:p14="http://schemas.microsoft.com/office/powerpoint/2010/main" val="2662609191"/>
+                <p14:modId xmlns:p14="http://schemas.microsoft.com/office/powerpoint/2010/main" val="3076143602"/>
               </p:ext>
             </p:extLst>
           </p:nvPr>
@@ -12887,14 +12653,14 @@
                 <a:gridCol w="2709333">
                   <a:extLst>
                     <a:ext uri="{9D8B030D-6E8A-4147-A177-3AD203B41FA5}">
-                      <a16:colId xmlns:a16="http://schemas.microsoft.com/office/drawing/2014/main" val="3113951091"/>
+                      <a16:colId xmlns:a16="http://schemas.microsoft.com/office/drawing/2014/main" val="1885649432"/>
                     </a:ext>
                   </a:extLst>
                 </a:gridCol>
                 <a:gridCol w="2709333">
                   <a:extLst>
                     <a:ext uri="{9D8B030D-6E8A-4147-A177-3AD203B41FA5}">
-                      <a16:colId xmlns:a16="http://schemas.microsoft.com/office/drawing/2014/main" val="1799123516"/>
+                      <a16:colId xmlns:a16="http://schemas.microsoft.com/office/drawing/2014/main" val="3113951091"/>
                     </a:ext>
                   </a:extLst>
                 </a:gridCol>
@@ -12905,12 +12671,9 @@
                     <a:bodyPr/>
                     <a:lstStyle/>
                     <a:p>
-                      <a:pPr algn="ctr" fontAlgn="ctr"/>
+                      <a:pPr algn="r" fontAlgn="ctr"/>
                       <a:r>
                         <a:rPr lang="fr-FR" b="1" dirty="0">
-                          <a:solidFill>
-                            <a:schemeClr val="bg1"/>
-                          </a:solidFill>
                           <a:effectLst/>
                         </a:rPr>
                         <a:t>model</a:t>
@@ -12924,12 +12687,9 @@
                     <a:bodyPr/>
                     <a:lstStyle/>
                     <a:p>
-                      <a:pPr algn="ctr" fontAlgn="ctr"/>
+                      <a:pPr algn="r" fontAlgn="ctr"/>
                       <a:r>
-                        <a:rPr lang="fr-FR" b="1">
-                          <a:solidFill>
-                            <a:schemeClr val="bg1"/>
-                          </a:solidFill>
+                        <a:rPr lang="fr-FR" b="1" dirty="0">
                           <a:effectLst/>
                         </a:rPr>
                         <a:t>ARI</a:t>
@@ -12943,21 +12703,15 @@
                     <a:bodyPr/>
                     <a:lstStyle/>
                     <a:p>
-                      <a:pPr algn="ctr" fontAlgn="ctr"/>
+                      <a:pPr algn="r" fontAlgn="ctr"/>
                       <a:r>
                         <a:rPr lang="fr-FR" b="1" dirty="0" err="1">
-                          <a:solidFill>
-                            <a:schemeClr val="bg1"/>
-                          </a:solidFill>
                           <a:effectLst/>
                         </a:rPr>
-                        <a:t>prediction</a:t>
+                        <a:t>processing</a:t>
                       </a:r>
                       <a:r>
                         <a:rPr lang="fr-FR" b="1" dirty="0">
-                          <a:solidFill>
-                            <a:schemeClr val="bg1"/>
-                          </a:solidFill>
                           <a:effectLst/>
                         </a:rPr>
                         <a:t> time (seconds)</a:t>
@@ -12978,20 +12732,14 @@
                     <a:bodyPr/>
                     <a:lstStyle/>
                     <a:p>
-                      <a:pPr algn="ctr" fontAlgn="ctr"/>
+                      <a:pPr algn="r" fontAlgn="ctr"/>
                       <a:r>
                         <a:rPr lang="fr-FR" dirty="0" err="1">
-                          <a:solidFill>
-                            <a:schemeClr val="bg1"/>
-                          </a:solidFill>
                           <a:effectLst/>
                         </a:rPr>
                         <a:t>CountVectorizer</a:t>
                       </a:r>
                       <a:endParaRPr lang="fr-FR" dirty="0">
-                        <a:solidFill>
-                          <a:schemeClr val="bg1"/>
-                        </a:solidFill>
                         <a:effectLst/>
                       </a:endParaRPr>
                     </a:p>
@@ -13003,12 +12751,9 @@
                     <a:bodyPr/>
                     <a:lstStyle/>
                     <a:p>
-                      <a:pPr algn="ctr" fontAlgn="ctr"/>
+                      <a:pPr algn="r" fontAlgn="ctr"/>
                       <a:r>
                         <a:rPr lang="fr-FR">
-                          <a:solidFill>
-                            <a:schemeClr val="bg1"/>
-                          </a:solidFill>
                           <a:effectLst/>
                         </a:rPr>
                         <a:t>0.39</a:t>
@@ -13022,15 +12767,12 @@
                     <a:bodyPr/>
                     <a:lstStyle/>
                     <a:p>
-                      <a:pPr algn="ctr" fontAlgn="ctr"/>
+                      <a:pPr algn="r" fontAlgn="ctr"/>
                       <a:r>
                         <a:rPr lang="fr-FR">
-                          <a:solidFill>
-                            <a:schemeClr val="bg1"/>
-                          </a:solidFill>
                           <a:effectLst/>
                         </a:rPr>
-                        <a:t>0.05</a:t>
+                        <a:t>39.00</a:t>
                       </a:r>
                     </a:p>
                   </a:txBody>
@@ -13048,20 +12790,14 @@
                     <a:bodyPr/>
                     <a:lstStyle/>
                     <a:p>
-                      <a:pPr algn="ctr" fontAlgn="ctr"/>
+                      <a:pPr algn="r" fontAlgn="ctr"/>
                       <a:r>
                         <a:rPr lang="fr-FR" dirty="0" err="1">
-                          <a:solidFill>
-                            <a:schemeClr val="bg1"/>
-                          </a:solidFill>
                           <a:effectLst/>
                         </a:rPr>
                         <a:t>TfidfVectorizer</a:t>
                       </a:r>
                       <a:endParaRPr lang="fr-FR" dirty="0">
-                        <a:solidFill>
-                          <a:schemeClr val="bg1"/>
-                        </a:solidFill>
                         <a:effectLst/>
                       </a:endParaRPr>
                     </a:p>
@@ -13073,12 +12809,9 @@
                     <a:bodyPr/>
                     <a:lstStyle/>
                     <a:p>
-                      <a:pPr algn="ctr" fontAlgn="ctr"/>
+                      <a:pPr algn="r" fontAlgn="ctr"/>
                       <a:r>
-                        <a:rPr lang="fr-FR" dirty="0">
-                          <a:solidFill>
-                            <a:schemeClr val="bg1"/>
-                          </a:solidFill>
+                        <a:rPr lang="fr-FR">
                           <a:effectLst/>
                         </a:rPr>
                         <a:t>0.47</a:t>
@@ -13092,15 +12825,12 @@
                     <a:bodyPr/>
                     <a:lstStyle/>
                     <a:p>
-                      <a:pPr algn="ctr" fontAlgn="ctr"/>
+                      <a:pPr algn="r" fontAlgn="ctr"/>
                       <a:r>
                         <a:rPr lang="fr-FR">
-                          <a:solidFill>
-                            <a:schemeClr val="bg1"/>
-                          </a:solidFill>
                           <a:effectLst/>
                         </a:rPr>
-                        <a:t>0.04</a:t>
+                        <a:t>17.00</a:t>
                       </a:r>
                     </a:p>
                   </a:txBody>
@@ -13118,12 +12848,9 @@
                     <a:bodyPr/>
                     <a:lstStyle/>
                     <a:p>
-                      <a:pPr algn="ctr" fontAlgn="ctr"/>
+                      <a:pPr algn="r" fontAlgn="ctr"/>
                       <a:r>
                         <a:rPr lang="fr-FR" dirty="0">
-                          <a:solidFill>
-                            <a:schemeClr val="bg1"/>
-                          </a:solidFill>
                           <a:effectLst/>
                         </a:rPr>
                         <a:t>Word2Vec</a:t>
@@ -13137,12 +12864,9 @@
                     <a:bodyPr/>
                     <a:lstStyle/>
                     <a:p>
-                      <a:pPr algn="ctr" fontAlgn="ctr"/>
+                      <a:pPr algn="r" fontAlgn="ctr"/>
                       <a:r>
-                        <a:rPr lang="fr-FR" dirty="0">
-                          <a:solidFill>
-                            <a:schemeClr val="bg1"/>
-                          </a:solidFill>
+                        <a:rPr lang="fr-FR">
                           <a:effectLst/>
                         </a:rPr>
                         <a:t>0.29</a:t>
@@ -13156,15 +12880,12 @@
                     <a:bodyPr/>
                     <a:lstStyle/>
                     <a:p>
-                      <a:pPr algn="ctr" fontAlgn="ctr"/>
+                      <a:pPr algn="r" fontAlgn="ctr"/>
                       <a:r>
                         <a:rPr lang="fr-FR">
-                          <a:solidFill>
-                            <a:schemeClr val="bg1"/>
-                          </a:solidFill>
                           <a:effectLst/>
                         </a:rPr>
-                        <a:t>0.18</a:t>
+                        <a:t>70.00</a:t>
                       </a:r>
                     </a:p>
                   </a:txBody>
@@ -13182,12 +12903,9 @@
                     <a:bodyPr/>
                     <a:lstStyle/>
                     <a:p>
-                      <a:pPr algn="ctr" fontAlgn="ctr"/>
+                      <a:pPr algn="r" fontAlgn="ctr"/>
                       <a:r>
                         <a:rPr lang="fr-FR">
-                          <a:solidFill>
-                            <a:schemeClr val="bg1"/>
-                          </a:solidFill>
                           <a:effectLst/>
                         </a:rPr>
                         <a:t>BERT</a:t>
@@ -13201,12 +12919,9 @@
                     <a:bodyPr/>
                     <a:lstStyle/>
                     <a:p>
-                      <a:pPr algn="ctr" fontAlgn="ctr"/>
+                      <a:pPr algn="r" fontAlgn="ctr"/>
                       <a:r>
                         <a:rPr lang="fr-FR" dirty="0">
-                          <a:solidFill>
-                            <a:schemeClr val="bg1"/>
-                          </a:solidFill>
                           <a:effectLst/>
                         </a:rPr>
                         <a:t>0.28</a:t>
@@ -13220,15 +12935,12 @@
                     <a:bodyPr/>
                     <a:lstStyle/>
                     <a:p>
-                      <a:pPr algn="ctr" fontAlgn="ctr"/>
+                      <a:pPr algn="r" fontAlgn="ctr"/>
                       <a:r>
-                        <a:rPr lang="fr-FR" dirty="0">
-                          <a:solidFill>
-                            <a:schemeClr val="bg1"/>
-                          </a:solidFill>
+                        <a:rPr lang="fr-FR">
                           <a:effectLst/>
                         </a:rPr>
-                        <a:t>205.70</a:t>
+                        <a:t>5.00</a:t>
                       </a:r>
                     </a:p>
                   </a:txBody>
@@ -13246,12 +12958,9 @@
                     <a:bodyPr/>
                     <a:lstStyle/>
                     <a:p>
-                      <a:pPr algn="ctr" fontAlgn="ctr"/>
+                      <a:pPr algn="r" fontAlgn="ctr"/>
                       <a:r>
                         <a:rPr lang="fr-FR">
-                          <a:solidFill>
-                            <a:schemeClr val="bg1"/>
-                          </a:solidFill>
                           <a:effectLst/>
                         </a:rPr>
                         <a:t>USE</a:t>
@@ -13265,12 +12974,9 @@
                     <a:bodyPr/>
                     <a:lstStyle/>
                     <a:p>
-                      <a:pPr algn="ctr" fontAlgn="ctr"/>
+                      <a:pPr algn="r" fontAlgn="ctr"/>
                       <a:r>
                         <a:rPr lang="fr-FR">
-                          <a:solidFill>
-                            <a:schemeClr val="bg1"/>
-                          </a:solidFill>
                           <a:effectLst/>
                         </a:rPr>
                         <a:t>0.44</a:t>
@@ -13284,15 +12990,12 @@
                     <a:bodyPr/>
                     <a:lstStyle/>
                     <a:p>
-                      <a:pPr algn="ctr" fontAlgn="ctr"/>
+                      <a:pPr algn="r" fontAlgn="ctr"/>
                       <a:r>
                         <a:rPr lang="fr-FR" dirty="0">
-                          <a:solidFill>
-                            <a:schemeClr val="bg1"/>
-                          </a:solidFill>
                           <a:effectLst/>
                         </a:rPr>
-                        <a:t>0.93</a:t>
+                        <a:t>5.00</a:t>
                       </a:r>
                     </a:p>
                   </a:txBody>
@@ -13323,7 +13026,7 @@
           <p:nvPr>
             <p:extLst>
               <p:ext uri="{D42A27DB-BD31-4B8C-83A1-F6EECF244321}">
-                <p14:modId xmlns:p14="http://schemas.microsoft.com/office/powerpoint/2010/main" val="2967795446"/>
+                <p14:modId xmlns:p14="http://schemas.microsoft.com/office/powerpoint/2010/main" val="2018964800"/>
               </p:ext>
             </p:extLst>
           </p:nvPr>
@@ -13367,12 +13070,9 @@
                     <a:bodyPr/>
                     <a:lstStyle/>
                     <a:p>
-                      <a:pPr algn="ctr" fontAlgn="ctr"/>
+                      <a:pPr algn="r" fontAlgn="ctr"/>
                       <a:r>
                         <a:rPr lang="fr-FR" b="1" dirty="0">
-                          <a:solidFill>
-                            <a:schemeClr val="bg1"/>
-                          </a:solidFill>
                           <a:effectLst/>
                         </a:rPr>
                         <a:t>model</a:t>
@@ -13386,12 +13086,9 @@
                     <a:bodyPr/>
                     <a:lstStyle/>
                     <a:p>
-                      <a:pPr algn="ctr" fontAlgn="ctr"/>
+                      <a:pPr algn="r" fontAlgn="ctr"/>
                       <a:r>
                         <a:rPr lang="fr-FR" b="1" dirty="0">
-                          <a:solidFill>
-                            <a:schemeClr val="bg1"/>
-                          </a:solidFill>
                           <a:effectLst/>
                         </a:rPr>
                         <a:t>ARI</a:t>
@@ -13405,36 +13102,18 @@
                     <a:bodyPr/>
                     <a:lstStyle/>
                     <a:p>
-                      <a:pPr algn="ctr" fontAlgn="ctr"/>
+                      <a:pPr algn="r" fontAlgn="ctr"/>
                       <a:r>
                         <a:rPr lang="fr-FR" b="1" dirty="0" err="1">
-                          <a:solidFill>
-                            <a:schemeClr val="bg1"/>
-                          </a:solidFill>
                           <a:effectLst/>
                         </a:rPr>
-                        <a:t>prediction</a:t>
+                        <a:t>processing</a:t>
                       </a:r>
                       <a:r>
                         <a:rPr lang="fr-FR" b="1" dirty="0">
-                          <a:solidFill>
-                            <a:schemeClr val="bg1"/>
-                          </a:solidFill>
                           <a:effectLst/>
                         </a:rPr>
-                        <a:t> time</a:t>
-                      </a:r>
-                    </a:p>
-                    <a:p>
-                      <a:pPr algn="ctr" fontAlgn="ctr"/>
-                      <a:r>
-                        <a:rPr lang="fr-FR" b="1" dirty="0">
-                          <a:solidFill>
-                            <a:schemeClr val="bg1"/>
-                          </a:solidFill>
-                          <a:effectLst/>
-                        </a:rPr>
-                        <a:t>(seconds)</a:t>
+                        <a:t> time (seconds)</a:t>
                       </a:r>
                     </a:p>
                   </a:txBody>
@@ -13452,7 +13131,7 @@
                     <a:bodyPr/>
                     <a:lstStyle/>
                     <a:p>
-                      <a:pPr algn="ctr" fontAlgn="ctr"/>
+                      <a:pPr algn="r" fontAlgn="ctr"/>
                       <a:r>
                         <a:rPr lang="fr-FR" dirty="0">
                           <a:effectLst/>
@@ -13468,7 +13147,7 @@
                     <a:bodyPr/>
                     <a:lstStyle/>
                     <a:p>
-                      <a:pPr algn="ctr" fontAlgn="ctr"/>
+                      <a:pPr algn="r" fontAlgn="ctr"/>
                       <a:r>
                         <a:rPr lang="fr-FR" dirty="0">
                           <a:effectLst/>
@@ -13484,12 +13163,12 @@
                     <a:bodyPr/>
                     <a:lstStyle/>
                     <a:p>
-                      <a:pPr algn="ctr" fontAlgn="ctr"/>
+                      <a:pPr algn="r" fontAlgn="ctr"/>
                       <a:r>
-                        <a:rPr lang="fr-FR">
+                        <a:rPr lang="fr-FR" dirty="0">
                           <a:effectLst/>
                         </a:rPr>
-                        <a:t>520.90</a:t>
+                        <a:t>512.38</a:t>
                       </a:r>
                     </a:p>
                   </a:txBody>
@@ -13507,7 +13186,7 @@
                     <a:bodyPr/>
                     <a:lstStyle/>
                     <a:p>
-                      <a:pPr algn="ctr" fontAlgn="ctr"/>
+                      <a:pPr algn="r" fontAlgn="ctr"/>
                       <a:r>
                         <a:rPr lang="fr-FR" dirty="0">
                           <a:effectLst/>
@@ -13523,7 +13202,7 @@
                     <a:bodyPr/>
                     <a:lstStyle/>
                     <a:p>
-                      <a:pPr algn="ctr" fontAlgn="ctr"/>
+                      <a:pPr algn="r" fontAlgn="ctr"/>
                       <a:r>
                         <a:rPr lang="fr-FR" dirty="0">
                           <a:effectLst/>
@@ -13539,12 +13218,12 @@
                     <a:bodyPr/>
                     <a:lstStyle/>
                     <a:p>
-                      <a:pPr algn="ctr" fontAlgn="ctr"/>
+                      <a:pPr algn="r" fontAlgn="ctr"/>
                       <a:r>
                         <a:rPr lang="fr-FR" dirty="0">
                           <a:effectLst/>
                         </a:rPr>
-                        <a:t>233.83</a:t>
+                        <a:t>224.21</a:t>
                       </a:r>
                     </a:p>
                   </a:txBody>
@@ -13676,7 +13355,7 @@
             </a:r>
             <a:r>
               <a:rPr lang="fr-FR" dirty="0"/>
-              <a:t> : 0.79 (ARI : 0.58) – </a:t>
+              <a:t> : 0.80 (ARI : 0.61) – </a:t>
             </a:r>
           </a:p>
           <a:p>
@@ -13687,15 +13366,7 @@
             </a:r>
             <a:r>
               <a:rPr lang="fr-FR" dirty="0"/>
-              <a:t> time </a:t>
-            </a:r>
-            <a:r>
-              <a:rPr lang="fr-FR" dirty="0" err="1"/>
-              <a:t>done</a:t>
-            </a:r>
-            <a:r>
-              <a:rPr lang="fr-FR" dirty="0"/>
-              <a:t> on the </a:t>
+              <a:t> time on the </a:t>
             </a:r>
             <a:r>
               <a:rPr lang="fr-FR" dirty="0" err="1"/>
@@ -13722,13 +13393,10 @@
               <a:t> model </a:t>
             </a:r>
             <a:r>
-              <a:rPr lang="fr-FR" dirty="0" err="1"/>
-              <a:t>is</a:t>
-            </a:r>
-            <a:r>
-              <a:rPr lang="fr-FR" dirty="0"/>
-              <a:t> 80 seconds</a:t>
-            </a:r>
+              <a:rPr lang="fr-FR"/>
+              <a:t>: 72 seconds</a:t>
+            </a:r>
+            <a:endParaRPr lang="fr-FR" dirty="0"/>
           </a:p>
           <a:p>
             <a:endParaRPr lang="fr-FR" dirty="0"/>
@@ -13743,7 +13411,7 @@
             <a:pPr lvl="1"/>
             <a:r>
               <a:rPr lang="fr-FR" dirty="0"/>
-              <a:t>The has been </a:t>
+              <a:t>The API has been </a:t>
             </a:r>
             <a:r>
               <a:rPr lang="fr-FR" dirty="0" err="1"/>

</xml_diff>